<commit_message>
german, bank and compas data updated
</commit_message>
<xml_diff>
--- a/figures/cascade figures.pptx
+++ b/figures/cascade figures.pptx
@@ -6540,7 +6540,7 @@
             <a:p>
               <a:r>
                 <a:rPr lang="en-US" sz="2400" dirty="0"/>
-                <a:t>3</a:t>
+                <a:t>4</a:t>
               </a:r>
             </a:p>
           </p:txBody>
@@ -6594,8 +6594,8 @@
           </p:nvSpPr>
           <p:spPr>
             <a:xfrm>
-              <a:off x="5608389" y="2775344"/>
-              <a:ext cx="427839" cy="461665"/>
+              <a:off x="5505799" y="2785313"/>
+              <a:ext cx="582687" cy="461665"/>
             </a:xfrm>
             <a:prstGeom prst="rect">
               <a:avLst/>
@@ -6610,7 +6610,7 @@
             <a:p>
               <a:r>
                 <a:rPr lang="en-US" sz="2400" dirty="0"/>
-                <a:t>9</a:t>
+                <a:t>12</a:t>
               </a:r>
             </a:p>
           </p:txBody>
@@ -6645,7 +6645,7 @@
             <a:p>
               <a:r>
                 <a:rPr lang="en-US" sz="2400" dirty="0"/>
-                <a:t>6</a:t>
+                <a:t>8</a:t>
               </a:r>
             </a:p>
           </p:txBody>
@@ -6715,7 +6715,7 @@
             <a:p>
               <a:r>
                 <a:rPr lang="en-US" sz="2400" dirty="0"/>
-                <a:t>18</a:t>
+                <a:t>24</a:t>
               </a:r>
             </a:p>
           </p:txBody>

</xml_diff>

<commit_message>
added table for R4
</commit_message>
<xml_diff>
--- a/figures/cascade figures.pptx
+++ b/figures/cascade figures.pptx
@@ -10,6 +10,7 @@
     <p:sldId id="258" r:id="rId4"/>
     <p:sldId id="257" r:id="rId5"/>
     <p:sldId id="260" r:id="rId6"/>
+    <p:sldId id="261" r:id="rId7"/>
   </p:sldIdLst>
   <p:sldSz cx="12192000" cy="6858000"/>
   <p:notesSz cx="6858000" cy="9144000"/>
@@ -8881,6 +8882,199 @@
 </p:sld>
 </file>
 
+<file path=ppt/slides/slide6.xml><?xml version="1.0" encoding="utf-8"?>
+<p:sld xmlns:a="http://schemas.openxmlformats.org/drawingml/2006/main" xmlns:r="http://schemas.openxmlformats.org/officeDocument/2006/relationships" xmlns:p="http://schemas.openxmlformats.org/presentationml/2006/main">
+  <p:cSld>
+    <p:spTree>
+      <p:nvGrpSpPr>
+        <p:cNvPr id="1" name=""/>
+        <p:cNvGrpSpPr/>
+        <p:nvPr/>
+      </p:nvGrpSpPr>
+      <p:grpSpPr>
+        <a:xfrm>
+          <a:off x="0" y="0"/>
+          <a:ext cx="0" cy="0"/>
+          <a:chOff x="0" y="0"/>
+          <a:chExt cx="0" cy="0"/>
+        </a:xfrm>
+      </p:grpSpPr>
+      <p:grpSp>
+        <p:nvGrpSpPr>
+          <p:cNvPr id="8" name="Group 7">
+            <a:extLst>
+              <a:ext uri="{FF2B5EF4-FFF2-40B4-BE49-F238E27FC236}">
+                <a16:creationId xmlns:a16="http://schemas.microsoft.com/office/drawing/2014/main" id="{1F0EDA8E-85C3-4172-9B6F-08F5196ED5A5}"/>
+              </a:ext>
+            </a:extLst>
+          </p:cNvPr>
+          <p:cNvGrpSpPr/>
+          <p:nvPr/>
+        </p:nvGrpSpPr>
+        <p:grpSpPr>
+          <a:xfrm>
+            <a:off x="1144776" y="1065559"/>
+            <a:ext cx="9902448" cy="3478271"/>
+            <a:chOff x="1144776" y="1065559"/>
+            <a:chExt cx="9902448" cy="3478271"/>
+          </a:xfrm>
+        </p:grpSpPr>
+        <p:pic>
+          <p:nvPicPr>
+            <p:cNvPr id="3" name="Picture 2" descr="Table&#10;&#10;Description automatically generated">
+              <a:extLst>
+                <a:ext uri="{FF2B5EF4-FFF2-40B4-BE49-F238E27FC236}">
+                  <a16:creationId xmlns:a16="http://schemas.microsoft.com/office/drawing/2014/main" id="{7AA360B8-9BFD-45BF-8806-21A09C565D94}"/>
+                </a:ext>
+              </a:extLst>
+            </p:cNvPr>
+            <p:cNvPicPr>
+              <a:picLocks noChangeAspect="1"/>
+            </p:cNvPicPr>
+            <p:nvPr/>
+          </p:nvPicPr>
+          <p:blipFill>
+            <a:blip r:embed="rId2">
+              <a:extLst>
+                <a:ext uri="{28A0092B-C50C-407E-A947-70E740481C1C}">
+                  <a14:useLocalDpi xmlns:a14="http://schemas.microsoft.com/office/drawing/2010/main" val="0"/>
+                </a:ext>
+              </a:extLst>
+            </a:blip>
+            <a:stretch>
+              <a:fillRect/>
+            </a:stretch>
+          </p:blipFill>
+          <p:spPr>
+            <a:xfrm>
+              <a:off x="6517887" y="1504968"/>
+              <a:ext cx="4529337" cy="3038862"/>
+            </a:xfrm>
+            <a:prstGeom prst="rect">
+              <a:avLst/>
+            </a:prstGeom>
+          </p:spPr>
+        </p:pic>
+        <p:pic>
+          <p:nvPicPr>
+            <p:cNvPr id="5" name="Picture 4" descr="Table, calendar&#10;&#10;Description automatically generated">
+              <a:extLst>
+                <a:ext uri="{FF2B5EF4-FFF2-40B4-BE49-F238E27FC236}">
+                  <a16:creationId xmlns:a16="http://schemas.microsoft.com/office/drawing/2014/main" id="{6D4251DD-B231-4EA9-ABE6-F0D4C6FE56D0}"/>
+                </a:ext>
+              </a:extLst>
+            </p:cNvPr>
+            <p:cNvPicPr>
+              <a:picLocks noChangeAspect="1"/>
+            </p:cNvPicPr>
+            <p:nvPr/>
+          </p:nvPicPr>
+          <p:blipFill>
+            <a:blip r:embed="rId3">
+              <a:extLst>
+                <a:ext uri="{28A0092B-C50C-407E-A947-70E740481C1C}">
+                  <a14:useLocalDpi xmlns:a14="http://schemas.microsoft.com/office/drawing/2010/main" val="0"/>
+                </a:ext>
+              </a:extLst>
+            </a:blip>
+            <a:stretch>
+              <a:fillRect/>
+            </a:stretch>
+          </p:blipFill>
+          <p:spPr>
+            <a:xfrm>
+              <a:off x="1144776" y="1504968"/>
+              <a:ext cx="4529337" cy="3038862"/>
+            </a:xfrm>
+            <a:prstGeom prst="rect">
+              <a:avLst/>
+            </a:prstGeom>
+          </p:spPr>
+        </p:pic>
+        <p:sp>
+          <p:nvSpPr>
+            <p:cNvPr id="6" name="TextBox 5">
+              <a:extLst>
+                <a:ext uri="{FF2B5EF4-FFF2-40B4-BE49-F238E27FC236}">
+                  <a16:creationId xmlns:a16="http://schemas.microsoft.com/office/drawing/2014/main" id="{94CC1648-CAC4-4627-ACB7-EBDFC04FC868}"/>
+                </a:ext>
+              </a:extLst>
+            </p:cNvPr>
+            <p:cNvSpPr txBox="1"/>
+            <p:nvPr/>
+          </p:nvSpPr>
+          <p:spPr>
+            <a:xfrm>
+              <a:off x="1846997" y="1065559"/>
+              <a:ext cx="3124894" cy="369332"/>
+            </a:xfrm>
+            <a:prstGeom prst="rect">
+              <a:avLst/>
+            </a:prstGeom>
+            <a:noFill/>
+          </p:spPr>
+          <p:txBody>
+            <a:bodyPr wrap="none" rtlCol="0">
+              <a:spAutoFit/>
+            </a:bodyPr>
+            <a:lstStyle/>
+            <a:p>
+              <a:r>
+                <a:rPr lang="en-US" dirty="0"/>
+                <a:t>(A) Likelihood of better fairness</a:t>
+              </a:r>
+            </a:p>
+          </p:txBody>
+        </p:sp>
+        <p:sp>
+          <p:nvSpPr>
+            <p:cNvPr id="7" name="TextBox 6">
+              <a:extLst>
+                <a:ext uri="{FF2B5EF4-FFF2-40B4-BE49-F238E27FC236}">
+                  <a16:creationId xmlns:a16="http://schemas.microsoft.com/office/drawing/2014/main" id="{81A7DFAA-F984-4944-913A-B5E30E4AA359}"/>
+                </a:ext>
+              </a:extLst>
+            </p:cNvPr>
+            <p:cNvSpPr txBox="1"/>
+            <p:nvPr/>
+          </p:nvSpPr>
+          <p:spPr>
+            <a:xfrm>
+              <a:off x="7320808" y="1065559"/>
+              <a:ext cx="2923493" cy="369332"/>
+            </a:xfrm>
+            <a:prstGeom prst="rect">
+              <a:avLst/>
+            </a:prstGeom>
+            <a:noFill/>
+          </p:spPr>
+          <p:txBody>
+            <a:bodyPr wrap="none" rtlCol="0">
+              <a:spAutoFit/>
+            </a:bodyPr>
+            <a:lstStyle/>
+            <a:p>
+              <a:r>
+                <a:rPr lang="en-US" dirty="0"/>
+                <a:t>(B) Likelihood of worse utility</a:t>
+              </a:r>
+            </a:p>
+          </p:txBody>
+        </p:sp>
+      </p:grpSp>
+    </p:spTree>
+    <p:extLst>
+      <p:ext uri="{BB962C8B-B14F-4D97-AF65-F5344CB8AC3E}">
+        <p14:creationId xmlns:p14="http://schemas.microsoft.com/office/powerpoint/2010/main" val="3205556672"/>
+      </p:ext>
+    </p:extLst>
+  </p:cSld>
+  <p:clrMapOvr>
+    <a:masterClrMapping/>
+  </p:clrMapOvr>
+</p:sld>
+</file>
+
 <file path=ppt/theme/theme1.xml><?xml version="1.0" encoding="utf-8"?>
 <a:theme xmlns:a="http://schemas.openxmlformats.org/drawingml/2006/main" name="Office Theme">
   <a:themeElements>

</xml_diff>

<commit_message>
group individual fairness plots
</commit_message>
<xml_diff>
--- a/figures/cascade figures.pptx
+++ b/figures/cascade figures.pptx
@@ -11,6 +11,7 @@
     <p:sldId id="257" r:id="rId5"/>
     <p:sldId id="260" r:id="rId6"/>
     <p:sldId id="261" r:id="rId7"/>
+    <p:sldId id="262" r:id="rId8"/>
   </p:sldIdLst>
   <p:sldSz cx="12192000" cy="6858000"/>
   <p:notesSz cx="6858000" cy="9144000"/>
@@ -264,7 +265,7 @@
           <a:p>
             <a:fld id="{A57C3778-0A6C-4CF7-879B-9660607AEF10}" type="datetimeFigureOut">
               <a:rPr lang="en-US" smtClean="0"/>
-              <a:t>1/6/2022</a:t>
+              <a:t>1/8/2022</a:t>
             </a:fld>
             <a:endParaRPr lang="en-US"/>
           </a:p>
@@ -462,7 +463,7 @@
           <a:p>
             <a:fld id="{A57C3778-0A6C-4CF7-879B-9660607AEF10}" type="datetimeFigureOut">
               <a:rPr lang="en-US" smtClean="0"/>
-              <a:t>1/6/2022</a:t>
+              <a:t>1/8/2022</a:t>
             </a:fld>
             <a:endParaRPr lang="en-US"/>
           </a:p>
@@ -670,7 +671,7 @@
           <a:p>
             <a:fld id="{A57C3778-0A6C-4CF7-879B-9660607AEF10}" type="datetimeFigureOut">
               <a:rPr lang="en-US" smtClean="0"/>
-              <a:t>1/6/2022</a:t>
+              <a:t>1/8/2022</a:t>
             </a:fld>
             <a:endParaRPr lang="en-US"/>
           </a:p>
@@ -868,7 +869,7 @@
           <a:p>
             <a:fld id="{A57C3778-0A6C-4CF7-879B-9660607AEF10}" type="datetimeFigureOut">
               <a:rPr lang="en-US" smtClean="0"/>
-              <a:t>1/6/2022</a:t>
+              <a:t>1/8/2022</a:t>
             </a:fld>
             <a:endParaRPr lang="en-US"/>
           </a:p>
@@ -1143,7 +1144,7 @@
           <a:p>
             <a:fld id="{A57C3778-0A6C-4CF7-879B-9660607AEF10}" type="datetimeFigureOut">
               <a:rPr lang="en-US" smtClean="0"/>
-              <a:t>1/6/2022</a:t>
+              <a:t>1/8/2022</a:t>
             </a:fld>
             <a:endParaRPr lang="en-US"/>
           </a:p>
@@ -1408,7 +1409,7 @@
           <a:p>
             <a:fld id="{A57C3778-0A6C-4CF7-879B-9660607AEF10}" type="datetimeFigureOut">
               <a:rPr lang="en-US" smtClean="0"/>
-              <a:t>1/6/2022</a:t>
+              <a:t>1/8/2022</a:t>
             </a:fld>
             <a:endParaRPr lang="en-US"/>
           </a:p>
@@ -1820,7 +1821,7 @@
           <a:p>
             <a:fld id="{A57C3778-0A6C-4CF7-879B-9660607AEF10}" type="datetimeFigureOut">
               <a:rPr lang="en-US" smtClean="0"/>
-              <a:t>1/6/2022</a:t>
+              <a:t>1/8/2022</a:t>
             </a:fld>
             <a:endParaRPr lang="en-US"/>
           </a:p>
@@ -1961,7 +1962,7 @@
           <a:p>
             <a:fld id="{A57C3778-0A6C-4CF7-879B-9660607AEF10}" type="datetimeFigureOut">
               <a:rPr lang="en-US" smtClean="0"/>
-              <a:t>1/6/2022</a:t>
+              <a:t>1/8/2022</a:t>
             </a:fld>
             <a:endParaRPr lang="en-US"/>
           </a:p>
@@ -2074,7 +2075,7 @@
           <a:p>
             <a:fld id="{A57C3778-0A6C-4CF7-879B-9660607AEF10}" type="datetimeFigureOut">
               <a:rPr lang="en-US" smtClean="0"/>
-              <a:t>1/6/2022</a:t>
+              <a:t>1/8/2022</a:t>
             </a:fld>
             <a:endParaRPr lang="en-US"/>
           </a:p>
@@ -2385,7 +2386,7 @@
           <a:p>
             <a:fld id="{A57C3778-0A6C-4CF7-879B-9660607AEF10}" type="datetimeFigureOut">
               <a:rPr lang="en-US" smtClean="0"/>
-              <a:t>1/6/2022</a:t>
+              <a:t>1/8/2022</a:t>
             </a:fld>
             <a:endParaRPr lang="en-US"/>
           </a:p>
@@ -2673,7 +2674,7 @@
           <a:p>
             <a:fld id="{A57C3778-0A6C-4CF7-879B-9660607AEF10}" type="datetimeFigureOut">
               <a:rPr lang="en-US" smtClean="0"/>
-              <a:t>1/6/2022</a:t>
+              <a:t>1/8/2022</a:t>
             </a:fld>
             <a:endParaRPr lang="en-US"/>
           </a:p>
@@ -2914,7 +2915,7 @@
           <a:p>
             <a:fld id="{A57C3778-0A6C-4CF7-879B-9660607AEF10}" type="datetimeFigureOut">
               <a:rPr lang="en-US" smtClean="0"/>
-              <a:t>1/6/2022</a:t>
+              <a:t>1/8/2022</a:t>
             </a:fld>
             <a:endParaRPr lang="en-US"/>
           </a:p>
@@ -8901,10 +8902,10 @@
       </p:grpSpPr>
       <p:grpSp>
         <p:nvGrpSpPr>
-          <p:cNvPr id="8" name="Group 7">
+          <p:cNvPr id="2" name="Group 1">
             <a:extLst>
               <a:ext uri="{FF2B5EF4-FFF2-40B4-BE49-F238E27FC236}">
-                <a16:creationId xmlns:a16="http://schemas.microsoft.com/office/drawing/2014/main" id="{1F0EDA8E-85C3-4172-9B6F-08F5196ED5A5}"/>
+                <a16:creationId xmlns:a16="http://schemas.microsoft.com/office/drawing/2014/main" id="{B62F6B29-78AF-4063-83D9-DEDDCA7181B1}"/>
               </a:ext>
             </a:extLst>
           </p:cNvPr>
@@ -8921,7 +8922,7 @@
         </p:grpSpPr>
         <p:pic>
           <p:nvPicPr>
-            <p:cNvPr id="3" name="Picture 2" descr="Table&#10;&#10;Description automatically generated">
+            <p:cNvPr id="3" name="Picture 2">
               <a:extLst>
                 <a:ext uri="{FF2B5EF4-FFF2-40B4-BE49-F238E27FC236}">
                   <a16:creationId xmlns:a16="http://schemas.microsoft.com/office/drawing/2014/main" id="{7AA360B8-9BFD-45BF-8806-21A09C565D94}"/>
@@ -8941,9 +8942,8 @@
                 </a:ext>
               </a:extLst>
             </a:blip>
-            <a:stretch>
-              <a:fillRect/>
-            </a:stretch>
+            <a:srcRect/>
+            <a:stretch/>
           </p:blipFill>
           <p:spPr>
             <a:xfrm>
@@ -9066,6 +9066,199 @@
     <p:extLst>
       <p:ext uri="{BB962C8B-B14F-4D97-AF65-F5344CB8AC3E}">
         <p14:creationId xmlns:p14="http://schemas.microsoft.com/office/powerpoint/2010/main" val="3205556672"/>
+      </p:ext>
+    </p:extLst>
+  </p:cSld>
+  <p:clrMapOvr>
+    <a:masterClrMapping/>
+  </p:clrMapOvr>
+</p:sld>
+</file>
+
+<file path=ppt/slides/slide7.xml><?xml version="1.0" encoding="utf-8"?>
+<p:sld xmlns:a="http://schemas.openxmlformats.org/drawingml/2006/main" xmlns:r="http://schemas.openxmlformats.org/officeDocument/2006/relationships" xmlns:p="http://schemas.openxmlformats.org/presentationml/2006/main">
+  <p:cSld>
+    <p:spTree>
+      <p:nvGrpSpPr>
+        <p:cNvPr id="1" name=""/>
+        <p:cNvGrpSpPr/>
+        <p:nvPr/>
+      </p:nvGrpSpPr>
+      <p:grpSpPr>
+        <a:xfrm>
+          <a:off x="0" y="0"/>
+          <a:ext cx="0" cy="0"/>
+          <a:chOff x="0" y="0"/>
+          <a:chExt cx="0" cy="0"/>
+        </a:xfrm>
+      </p:grpSpPr>
+      <p:grpSp>
+        <p:nvGrpSpPr>
+          <p:cNvPr id="20" name="Group 19">
+            <a:extLst>
+              <a:ext uri="{FF2B5EF4-FFF2-40B4-BE49-F238E27FC236}">
+                <a16:creationId xmlns:a16="http://schemas.microsoft.com/office/drawing/2014/main" id="{C06CCE90-A89E-4F25-8D3B-EDFA0B7239FC}"/>
+              </a:ext>
+            </a:extLst>
+          </p:cNvPr>
+          <p:cNvGrpSpPr/>
+          <p:nvPr/>
+        </p:nvGrpSpPr>
+        <p:grpSpPr>
+          <a:xfrm>
+            <a:off x="827743" y="1446100"/>
+            <a:ext cx="10998711" cy="3965800"/>
+            <a:chOff x="803466" y="1282682"/>
+            <a:chExt cx="10998711" cy="3965800"/>
+          </a:xfrm>
+        </p:grpSpPr>
+        <p:sp>
+          <p:nvSpPr>
+            <p:cNvPr id="13" name="TextBox 12">
+              <a:extLst>
+                <a:ext uri="{FF2B5EF4-FFF2-40B4-BE49-F238E27FC236}">
+                  <a16:creationId xmlns:a16="http://schemas.microsoft.com/office/drawing/2014/main" id="{182B60BC-9C9F-4C70-8F1A-F7B479A96293}"/>
+                </a:ext>
+              </a:extLst>
+            </p:cNvPr>
+            <p:cNvSpPr txBox="1"/>
+            <p:nvPr/>
+          </p:nvSpPr>
+          <p:spPr>
+            <a:xfrm>
+              <a:off x="1818590" y="1282682"/>
+              <a:ext cx="2411433" cy="369332"/>
+            </a:xfrm>
+            <a:prstGeom prst="rect">
+              <a:avLst/>
+            </a:prstGeom>
+            <a:noFill/>
+          </p:spPr>
+          <p:txBody>
+            <a:bodyPr wrap="square" rtlCol="0">
+              <a:spAutoFit/>
+            </a:bodyPr>
+            <a:lstStyle/>
+            <a:p>
+              <a:r>
+                <a:rPr lang="en-US" dirty="0"/>
+                <a:t>(A) Group Fairness</a:t>
+              </a:r>
+            </a:p>
+          </p:txBody>
+        </p:sp>
+        <p:sp>
+          <p:nvSpPr>
+            <p:cNvPr id="14" name="TextBox 13">
+              <a:extLst>
+                <a:ext uri="{FF2B5EF4-FFF2-40B4-BE49-F238E27FC236}">
+                  <a16:creationId xmlns:a16="http://schemas.microsoft.com/office/drawing/2014/main" id="{D31617E6-DEBC-404A-A3F9-32D21F32276B}"/>
+                </a:ext>
+              </a:extLst>
+            </p:cNvPr>
+            <p:cNvSpPr txBox="1"/>
+            <p:nvPr/>
+          </p:nvSpPr>
+          <p:spPr>
+            <a:xfrm>
+              <a:off x="7711651" y="1282682"/>
+              <a:ext cx="3261150" cy="369332"/>
+            </a:xfrm>
+            <a:prstGeom prst="rect">
+              <a:avLst/>
+            </a:prstGeom>
+            <a:noFill/>
+          </p:spPr>
+          <p:txBody>
+            <a:bodyPr wrap="square" rtlCol="0">
+              <a:spAutoFit/>
+            </a:bodyPr>
+            <a:lstStyle/>
+            <a:p>
+              <a:r>
+                <a:rPr lang="en-US" dirty="0"/>
+                <a:t>(B) Individual Fairness</a:t>
+              </a:r>
+            </a:p>
+          </p:txBody>
+        </p:sp>
+        <p:pic>
+          <p:nvPicPr>
+            <p:cNvPr id="16" name="Picture 15" descr="Chart, bar chart&#10;&#10;Description automatically generated">
+              <a:extLst>
+                <a:ext uri="{FF2B5EF4-FFF2-40B4-BE49-F238E27FC236}">
+                  <a16:creationId xmlns:a16="http://schemas.microsoft.com/office/drawing/2014/main" id="{72BB604D-7D9B-44A2-86C0-2E9E54AE0DDF}"/>
+                </a:ext>
+              </a:extLst>
+            </p:cNvPr>
+            <p:cNvPicPr>
+              <a:picLocks noChangeAspect="1"/>
+            </p:cNvPicPr>
+            <p:nvPr/>
+          </p:nvPicPr>
+          <p:blipFill>
+            <a:blip r:embed="rId2">
+              <a:extLst>
+                <a:ext uri="{28A0092B-C50C-407E-A947-70E740481C1C}">
+                  <a14:useLocalDpi xmlns:a14="http://schemas.microsoft.com/office/drawing/2010/main" val="0"/>
+                </a:ext>
+              </a:extLst>
+            </a:blip>
+            <a:stretch>
+              <a:fillRect/>
+            </a:stretch>
+          </p:blipFill>
+          <p:spPr>
+            <a:xfrm>
+              <a:off x="5984003" y="1652013"/>
+              <a:ext cx="5818174" cy="3596469"/>
+            </a:xfrm>
+            <a:prstGeom prst="rect">
+              <a:avLst/>
+            </a:prstGeom>
+          </p:spPr>
+        </p:pic>
+        <p:pic>
+          <p:nvPicPr>
+            <p:cNvPr id="18" name="Picture 17" descr="Chart, bar chart&#10;&#10;Description automatically generated">
+              <a:extLst>
+                <a:ext uri="{FF2B5EF4-FFF2-40B4-BE49-F238E27FC236}">
+                  <a16:creationId xmlns:a16="http://schemas.microsoft.com/office/drawing/2014/main" id="{1DCA0EEB-219D-49FF-B4CC-1B30A749B3AB}"/>
+                </a:ext>
+              </a:extLst>
+            </p:cNvPr>
+            <p:cNvPicPr>
+              <a:picLocks noChangeAspect="1"/>
+            </p:cNvPicPr>
+            <p:nvPr/>
+          </p:nvPicPr>
+          <p:blipFill>
+            <a:blip r:embed="rId3">
+              <a:extLst>
+                <a:ext uri="{28A0092B-C50C-407E-A947-70E740481C1C}">
+                  <a14:useLocalDpi xmlns:a14="http://schemas.microsoft.com/office/drawing/2010/main" val="0"/>
+                </a:ext>
+              </a:extLst>
+            </a:blip>
+            <a:stretch>
+              <a:fillRect/>
+            </a:stretch>
+          </p:blipFill>
+          <p:spPr>
+            <a:xfrm>
+              <a:off x="803466" y="1612738"/>
+              <a:ext cx="4441680" cy="3596469"/>
+            </a:xfrm>
+            <a:prstGeom prst="rect">
+              <a:avLst/>
+            </a:prstGeom>
+          </p:spPr>
+        </p:pic>
+      </p:grpSp>
+    </p:spTree>
+    <p:extLst>
+      <p:ext uri="{BB962C8B-B14F-4D97-AF65-F5344CB8AC3E}">
+        <p14:creationId xmlns:p14="http://schemas.microsoft.com/office/powerpoint/2010/main" val="3309823251"/>
       </p:ext>
     </p:extLst>
   </p:cSld>

</xml_diff>

<commit_message>
added plot for fpr_compas
</commit_message>
<xml_diff>
--- a/figures/cascade figures.pptx
+++ b/figures/cascade figures.pptx
@@ -265,7 +265,7 @@
           <a:p>
             <a:fld id="{A57C3778-0A6C-4CF7-879B-9660607AEF10}" type="datetimeFigureOut">
               <a:rPr lang="en-US" smtClean="0"/>
-              <a:t>1/8/2022</a:t>
+              <a:t>1/9/2022</a:t>
             </a:fld>
             <a:endParaRPr lang="en-US"/>
           </a:p>
@@ -463,7 +463,7 @@
           <a:p>
             <a:fld id="{A57C3778-0A6C-4CF7-879B-9660607AEF10}" type="datetimeFigureOut">
               <a:rPr lang="en-US" smtClean="0"/>
-              <a:t>1/8/2022</a:t>
+              <a:t>1/9/2022</a:t>
             </a:fld>
             <a:endParaRPr lang="en-US"/>
           </a:p>
@@ -671,7 +671,7 @@
           <a:p>
             <a:fld id="{A57C3778-0A6C-4CF7-879B-9660607AEF10}" type="datetimeFigureOut">
               <a:rPr lang="en-US" smtClean="0"/>
-              <a:t>1/8/2022</a:t>
+              <a:t>1/9/2022</a:t>
             </a:fld>
             <a:endParaRPr lang="en-US"/>
           </a:p>
@@ -869,7 +869,7 @@
           <a:p>
             <a:fld id="{A57C3778-0A6C-4CF7-879B-9660607AEF10}" type="datetimeFigureOut">
               <a:rPr lang="en-US" smtClean="0"/>
-              <a:t>1/8/2022</a:t>
+              <a:t>1/9/2022</a:t>
             </a:fld>
             <a:endParaRPr lang="en-US"/>
           </a:p>
@@ -1144,7 +1144,7 @@
           <a:p>
             <a:fld id="{A57C3778-0A6C-4CF7-879B-9660607AEF10}" type="datetimeFigureOut">
               <a:rPr lang="en-US" smtClean="0"/>
-              <a:t>1/8/2022</a:t>
+              <a:t>1/9/2022</a:t>
             </a:fld>
             <a:endParaRPr lang="en-US"/>
           </a:p>
@@ -1409,7 +1409,7 @@
           <a:p>
             <a:fld id="{A57C3778-0A6C-4CF7-879B-9660607AEF10}" type="datetimeFigureOut">
               <a:rPr lang="en-US" smtClean="0"/>
-              <a:t>1/8/2022</a:t>
+              <a:t>1/9/2022</a:t>
             </a:fld>
             <a:endParaRPr lang="en-US"/>
           </a:p>
@@ -1821,7 +1821,7 @@
           <a:p>
             <a:fld id="{A57C3778-0A6C-4CF7-879B-9660607AEF10}" type="datetimeFigureOut">
               <a:rPr lang="en-US" smtClean="0"/>
-              <a:t>1/8/2022</a:t>
+              <a:t>1/9/2022</a:t>
             </a:fld>
             <a:endParaRPr lang="en-US"/>
           </a:p>
@@ -1962,7 +1962,7 @@
           <a:p>
             <a:fld id="{A57C3778-0A6C-4CF7-879B-9660607AEF10}" type="datetimeFigureOut">
               <a:rPr lang="en-US" smtClean="0"/>
-              <a:t>1/8/2022</a:t>
+              <a:t>1/9/2022</a:t>
             </a:fld>
             <a:endParaRPr lang="en-US"/>
           </a:p>
@@ -2075,7 +2075,7 @@
           <a:p>
             <a:fld id="{A57C3778-0A6C-4CF7-879B-9660607AEF10}" type="datetimeFigureOut">
               <a:rPr lang="en-US" smtClean="0"/>
-              <a:t>1/8/2022</a:t>
+              <a:t>1/9/2022</a:t>
             </a:fld>
             <a:endParaRPr lang="en-US"/>
           </a:p>
@@ -2386,7 +2386,7 @@
           <a:p>
             <a:fld id="{A57C3778-0A6C-4CF7-879B-9660607AEF10}" type="datetimeFigureOut">
               <a:rPr lang="en-US" smtClean="0"/>
-              <a:t>1/8/2022</a:t>
+              <a:t>1/9/2022</a:t>
             </a:fld>
             <a:endParaRPr lang="en-US"/>
           </a:p>
@@ -2674,7 +2674,7 @@
           <a:p>
             <a:fld id="{A57C3778-0A6C-4CF7-879B-9660607AEF10}" type="datetimeFigureOut">
               <a:rPr lang="en-US" smtClean="0"/>
-              <a:t>1/8/2022</a:t>
+              <a:t>1/9/2022</a:t>
             </a:fld>
             <a:endParaRPr lang="en-US"/>
           </a:p>
@@ -2915,7 +2915,7 @@
           <a:p>
             <a:fld id="{A57C3778-0A6C-4CF7-879B-9660607AEF10}" type="datetimeFigureOut">
               <a:rPr lang="en-US" smtClean="0"/>
-              <a:t>1/8/2022</a:t>
+              <a:t>1/9/2022</a:t>
             </a:fld>
             <a:endParaRPr lang="en-US"/>
           </a:p>
@@ -8902,10 +8902,10 @@
       </p:grpSpPr>
       <p:grpSp>
         <p:nvGrpSpPr>
-          <p:cNvPr id="2" name="Group 1">
+          <p:cNvPr id="4" name="Group 3">
             <a:extLst>
               <a:ext uri="{FF2B5EF4-FFF2-40B4-BE49-F238E27FC236}">
-                <a16:creationId xmlns:a16="http://schemas.microsoft.com/office/drawing/2014/main" id="{B62F6B29-78AF-4063-83D9-DEDDCA7181B1}"/>
+                <a16:creationId xmlns:a16="http://schemas.microsoft.com/office/drawing/2014/main" id="{37E43D80-BCC7-489B-87A2-95509BF6D0C5}"/>
               </a:ext>
             </a:extLst>
           </p:cNvPr>
@@ -8957,7 +8957,7 @@
         </p:pic>
         <p:pic>
           <p:nvPicPr>
-            <p:cNvPr id="5" name="Picture 4" descr="Table, calendar&#10;&#10;Description automatically generated">
+            <p:cNvPr id="5" name="Picture 4">
               <a:extLst>
                 <a:ext uri="{FF2B5EF4-FFF2-40B4-BE49-F238E27FC236}">
                   <a16:creationId xmlns:a16="http://schemas.microsoft.com/office/drawing/2014/main" id="{6D4251DD-B231-4EA9-ABE6-F0D4C6FE56D0}"/>
@@ -8977,14 +8977,13 @@
                 </a:ext>
               </a:extLst>
             </a:blip>
-            <a:stretch>
-              <a:fillRect/>
-            </a:stretch>
+            <a:srcRect/>
+            <a:stretch/>
           </p:blipFill>
           <p:spPr>
             <a:xfrm>
-              <a:off x="1144776" y="1504968"/>
-              <a:ext cx="4529337" cy="3038862"/>
+              <a:off x="1144776" y="1505093"/>
+              <a:ext cx="4529337" cy="3038611"/>
             </a:xfrm>
             <a:prstGeom prst="rect">
               <a:avLst/>
@@ -9094,10 +9093,10 @@
       </p:grpSpPr>
       <p:grpSp>
         <p:nvGrpSpPr>
-          <p:cNvPr id="20" name="Group 19">
+          <p:cNvPr id="17" name="Group 16">
             <a:extLst>
               <a:ext uri="{FF2B5EF4-FFF2-40B4-BE49-F238E27FC236}">
-                <a16:creationId xmlns:a16="http://schemas.microsoft.com/office/drawing/2014/main" id="{C06CCE90-A89E-4F25-8D3B-EDFA0B7239FC}"/>
+                <a16:creationId xmlns:a16="http://schemas.microsoft.com/office/drawing/2014/main" id="{26A27E9D-8EC7-493D-B045-DED62A212842}"/>
               </a:ext>
             </a:extLst>
           </p:cNvPr>
@@ -9106,10 +9105,10 @@
         </p:nvGrpSpPr>
         <p:grpSpPr>
           <a:xfrm>
-            <a:off x="827743" y="1446100"/>
-            <a:ext cx="10998711" cy="3965800"/>
-            <a:chOff x="803466" y="1282682"/>
-            <a:chExt cx="10998711" cy="3965800"/>
+            <a:off x="917475" y="1446100"/>
+            <a:ext cx="10828788" cy="3494794"/>
+            <a:chOff x="917475" y="1446100"/>
+            <a:chExt cx="10828788" cy="3494794"/>
           </a:xfrm>
         </p:grpSpPr>
         <p:sp>
@@ -9126,7 +9125,7 @@
           </p:nvSpPr>
           <p:spPr>
             <a:xfrm>
-              <a:off x="1818590" y="1282682"/>
+              <a:off x="1842867" y="1446100"/>
               <a:ext cx="2411433" cy="369332"/>
             </a:xfrm>
             <a:prstGeom prst="rect">
@@ -9161,7 +9160,7 @@
           </p:nvSpPr>
           <p:spPr>
             <a:xfrm>
-              <a:off x="7711651" y="1282682"/>
+              <a:off x="7598363" y="1446100"/>
               <a:ext cx="3261150" cy="369332"/>
             </a:xfrm>
             <a:prstGeom prst="rect">
@@ -9184,10 +9183,10 @@
         </p:sp>
         <p:pic>
           <p:nvPicPr>
-            <p:cNvPr id="16" name="Picture 15" descr="Chart, bar chart&#10;&#10;Description automatically generated">
+            <p:cNvPr id="10" name="Picture 9">
               <a:extLst>
                 <a:ext uri="{FF2B5EF4-FFF2-40B4-BE49-F238E27FC236}">
-                  <a16:creationId xmlns:a16="http://schemas.microsoft.com/office/drawing/2014/main" id="{72BB604D-7D9B-44A2-86C0-2E9E54AE0DDF}"/>
+                  <a16:creationId xmlns:a16="http://schemas.microsoft.com/office/drawing/2014/main" id="{A0CB6359-844C-4C18-9BBE-3B66DED31673}"/>
                 </a:ext>
               </a:extLst>
             </p:cNvPr>
@@ -9204,14 +9203,13 @@
                 </a:ext>
               </a:extLst>
             </a:blip>
-            <a:stretch>
-              <a:fillRect/>
-            </a:stretch>
+            <a:srcRect/>
+            <a:stretch/>
           </p:blipFill>
           <p:spPr>
             <a:xfrm>
-              <a:off x="5984003" y="1652013"/>
-              <a:ext cx="5818174" cy="3596469"/>
+              <a:off x="5792540" y="1630766"/>
+              <a:ext cx="5953723" cy="3307624"/>
             </a:xfrm>
             <a:prstGeom prst="rect">
               <a:avLst/>
@@ -9220,10 +9218,10 @@
         </p:pic>
         <p:pic>
           <p:nvPicPr>
-            <p:cNvPr id="18" name="Picture 17" descr="Chart, bar chart&#10;&#10;Description automatically generated">
+            <p:cNvPr id="12" name="Picture 11">
               <a:extLst>
                 <a:ext uri="{FF2B5EF4-FFF2-40B4-BE49-F238E27FC236}">
-                  <a16:creationId xmlns:a16="http://schemas.microsoft.com/office/drawing/2014/main" id="{1DCA0EEB-219D-49FF-B4CC-1B30A749B3AB}"/>
+                  <a16:creationId xmlns:a16="http://schemas.microsoft.com/office/drawing/2014/main" id="{FBDAECB3-3387-40DC-BDB8-52312C709A6B}"/>
                 </a:ext>
               </a:extLst>
             </p:cNvPr>
@@ -9240,14 +9238,13 @@
                 </a:ext>
               </a:extLst>
             </a:blip>
-            <a:stretch>
-              <a:fillRect/>
-            </a:stretch>
+            <a:srcRect/>
+            <a:stretch/>
           </p:blipFill>
           <p:spPr>
             <a:xfrm>
-              <a:off x="803466" y="1612738"/>
-              <a:ext cx="4441680" cy="3596469"/>
+              <a:off x="917475" y="1630766"/>
+              <a:ext cx="3972153" cy="3310128"/>
             </a:xfrm>
             <a:prstGeom prst="rect">
               <a:avLst/>

</xml_diff>

<commit_message>
added pic for increasing bias
</commit_message>
<xml_diff>
--- a/figures/cascade figures.pptx
+++ b/figures/cascade figures.pptx
@@ -12,6 +12,7 @@
     <p:sldId id="260" r:id="rId6"/>
     <p:sldId id="261" r:id="rId7"/>
     <p:sldId id="262" r:id="rId8"/>
+    <p:sldId id="263" r:id="rId9"/>
   </p:sldIdLst>
   <p:sldSz cx="12192000" cy="6858000"/>
   <p:notesSz cx="6858000" cy="9144000"/>
@@ -265,7 +266,7 @@
           <a:p>
             <a:fld id="{A57C3778-0A6C-4CF7-879B-9660607AEF10}" type="datetimeFigureOut">
               <a:rPr lang="en-US" smtClean="0"/>
-              <a:t>1/9/2022</a:t>
+              <a:t>1/10/2022</a:t>
             </a:fld>
             <a:endParaRPr lang="en-US"/>
           </a:p>
@@ -463,7 +464,7 @@
           <a:p>
             <a:fld id="{A57C3778-0A6C-4CF7-879B-9660607AEF10}" type="datetimeFigureOut">
               <a:rPr lang="en-US" smtClean="0"/>
-              <a:t>1/9/2022</a:t>
+              <a:t>1/10/2022</a:t>
             </a:fld>
             <a:endParaRPr lang="en-US"/>
           </a:p>
@@ -671,7 +672,7 @@
           <a:p>
             <a:fld id="{A57C3778-0A6C-4CF7-879B-9660607AEF10}" type="datetimeFigureOut">
               <a:rPr lang="en-US" smtClean="0"/>
-              <a:t>1/9/2022</a:t>
+              <a:t>1/10/2022</a:t>
             </a:fld>
             <a:endParaRPr lang="en-US"/>
           </a:p>
@@ -869,7 +870,7 @@
           <a:p>
             <a:fld id="{A57C3778-0A6C-4CF7-879B-9660607AEF10}" type="datetimeFigureOut">
               <a:rPr lang="en-US" smtClean="0"/>
-              <a:t>1/9/2022</a:t>
+              <a:t>1/10/2022</a:t>
             </a:fld>
             <a:endParaRPr lang="en-US"/>
           </a:p>
@@ -1144,7 +1145,7 @@
           <a:p>
             <a:fld id="{A57C3778-0A6C-4CF7-879B-9660607AEF10}" type="datetimeFigureOut">
               <a:rPr lang="en-US" smtClean="0"/>
-              <a:t>1/9/2022</a:t>
+              <a:t>1/10/2022</a:t>
             </a:fld>
             <a:endParaRPr lang="en-US"/>
           </a:p>
@@ -1409,7 +1410,7 @@
           <a:p>
             <a:fld id="{A57C3778-0A6C-4CF7-879B-9660607AEF10}" type="datetimeFigureOut">
               <a:rPr lang="en-US" smtClean="0"/>
-              <a:t>1/9/2022</a:t>
+              <a:t>1/10/2022</a:t>
             </a:fld>
             <a:endParaRPr lang="en-US"/>
           </a:p>
@@ -1821,7 +1822,7 @@
           <a:p>
             <a:fld id="{A57C3778-0A6C-4CF7-879B-9660607AEF10}" type="datetimeFigureOut">
               <a:rPr lang="en-US" smtClean="0"/>
-              <a:t>1/9/2022</a:t>
+              <a:t>1/10/2022</a:t>
             </a:fld>
             <a:endParaRPr lang="en-US"/>
           </a:p>
@@ -1962,7 +1963,7 @@
           <a:p>
             <a:fld id="{A57C3778-0A6C-4CF7-879B-9660607AEF10}" type="datetimeFigureOut">
               <a:rPr lang="en-US" smtClean="0"/>
-              <a:t>1/9/2022</a:t>
+              <a:t>1/10/2022</a:t>
             </a:fld>
             <a:endParaRPr lang="en-US"/>
           </a:p>
@@ -2075,7 +2076,7 @@
           <a:p>
             <a:fld id="{A57C3778-0A6C-4CF7-879B-9660607AEF10}" type="datetimeFigureOut">
               <a:rPr lang="en-US" smtClean="0"/>
-              <a:t>1/9/2022</a:t>
+              <a:t>1/10/2022</a:t>
             </a:fld>
             <a:endParaRPr lang="en-US"/>
           </a:p>
@@ -2386,7 +2387,7 @@
           <a:p>
             <a:fld id="{A57C3778-0A6C-4CF7-879B-9660607AEF10}" type="datetimeFigureOut">
               <a:rPr lang="en-US" smtClean="0"/>
-              <a:t>1/9/2022</a:t>
+              <a:t>1/10/2022</a:t>
             </a:fld>
             <a:endParaRPr lang="en-US"/>
           </a:p>
@@ -2674,7 +2675,7 @@
           <a:p>
             <a:fld id="{A57C3778-0A6C-4CF7-879B-9660607AEF10}" type="datetimeFigureOut">
               <a:rPr lang="en-US" smtClean="0"/>
-              <a:t>1/9/2022</a:t>
+              <a:t>1/10/2022</a:t>
             </a:fld>
             <a:endParaRPr lang="en-US"/>
           </a:p>
@@ -2915,7 +2916,7 @@
           <a:p>
             <a:fld id="{A57C3778-0A6C-4CF7-879B-9660607AEF10}" type="datetimeFigureOut">
               <a:rPr lang="en-US" smtClean="0"/>
-              <a:t>1/9/2022</a:t>
+              <a:t>1/10/2022</a:t>
             </a:fld>
             <a:endParaRPr lang="en-US"/>
           </a:p>
@@ -9265,6 +9266,197 @@
 </p:sld>
 </file>
 
+<file path=ppt/slides/slide8.xml><?xml version="1.0" encoding="utf-8"?>
+<p:sld xmlns:a="http://schemas.openxmlformats.org/drawingml/2006/main" xmlns:r="http://schemas.openxmlformats.org/officeDocument/2006/relationships" xmlns:p="http://schemas.openxmlformats.org/presentationml/2006/main">
+  <p:cSld>
+    <p:spTree>
+      <p:nvGrpSpPr>
+        <p:cNvPr id="1" name=""/>
+        <p:cNvGrpSpPr/>
+        <p:nvPr/>
+      </p:nvGrpSpPr>
+      <p:grpSpPr>
+        <a:xfrm>
+          <a:off x="0" y="0"/>
+          <a:ext cx="0" cy="0"/>
+          <a:chOff x="0" y="0"/>
+          <a:chExt cx="0" cy="0"/>
+        </a:xfrm>
+      </p:grpSpPr>
+      <p:grpSp>
+        <p:nvGrpSpPr>
+          <p:cNvPr id="3" name="Group 2">
+            <a:extLst>
+              <a:ext uri="{FF2B5EF4-FFF2-40B4-BE49-F238E27FC236}">
+                <a16:creationId xmlns:a16="http://schemas.microsoft.com/office/drawing/2014/main" id="{2EE44A9E-0896-4AA5-BFE5-7E24E609FBA9}"/>
+              </a:ext>
+            </a:extLst>
+          </p:cNvPr>
+          <p:cNvGrpSpPr/>
+          <p:nvPr/>
+        </p:nvGrpSpPr>
+        <p:grpSpPr>
+          <a:xfrm>
+            <a:off x="739584" y="1440824"/>
+            <a:ext cx="11006679" cy="3497565"/>
+            <a:chOff x="739584" y="1440824"/>
+            <a:chExt cx="11006679" cy="3497565"/>
+          </a:xfrm>
+        </p:grpSpPr>
+        <p:sp>
+          <p:nvSpPr>
+            <p:cNvPr id="13" name="TextBox 12">
+              <a:extLst>
+                <a:ext uri="{FF2B5EF4-FFF2-40B4-BE49-F238E27FC236}">
+                  <a16:creationId xmlns:a16="http://schemas.microsoft.com/office/drawing/2014/main" id="{182B60BC-9C9F-4C70-8F1A-F7B479A96293}"/>
+                </a:ext>
+              </a:extLst>
+            </p:cNvPr>
+            <p:cNvSpPr txBox="1"/>
+            <p:nvPr/>
+          </p:nvSpPr>
+          <p:spPr>
+            <a:xfrm>
+              <a:off x="2166021" y="1440824"/>
+              <a:ext cx="2411433" cy="369332"/>
+            </a:xfrm>
+            <a:prstGeom prst="rect">
+              <a:avLst/>
+            </a:prstGeom>
+            <a:noFill/>
+          </p:spPr>
+          <p:txBody>
+            <a:bodyPr wrap="square" rtlCol="0">
+              <a:spAutoFit/>
+            </a:bodyPr>
+            <a:lstStyle/>
+            <a:p>
+              <a:r>
+                <a:rPr lang="en-US" dirty="0"/>
+                <a:t>(A) Group Fairness</a:t>
+              </a:r>
+            </a:p>
+          </p:txBody>
+        </p:sp>
+        <p:sp>
+          <p:nvSpPr>
+            <p:cNvPr id="14" name="TextBox 13">
+              <a:extLst>
+                <a:ext uri="{FF2B5EF4-FFF2-40B4-BE49-F238E27FC236}">
+                  <a16:creationId xmlns:a16="http://schemas.microsoft.com/office/drawing/2014/main" id="{D31617E6-DEBC-404A-A3F9-32D21F32276B}"/>
+                </a:ext>
+              </a:extLst>
+            </p:cNvPr>
+            <p:cNvSpPr txBox="1"/>
+            <p:nvPr/>
+          </p:nvSpPr>
+          <p:spPr>
+            <a:xfrm>
+              <a:off x="7614547" y="1446100"/>
+              <a:ext cx="3261150" cy="369332"/>
+            </a:xfrm>
+            <a:prstGeom prst="rect">
+              <a:avLst/>
+            </a:prstGeom>
+            <a:noFill/>
+          </p:spPr>
+          <p:txBody>
+            <a:bodyPr wrap="square" rtlCol="0">
+              <a:spAutoFit/>
+            </a:bodyPr>
+            <a:lstStyle/>
+            <a:p>
+              <a:r>
+                <a:rPr lang="en-US" dirty="0"/>
+                <a:t>(B) Individual Fairness</a:t>
+              </a:r>
+            </a:p>
+          </p:txBody>
+        </p:sp>
+        <p:pic>
+          <p:nvPicPr>
+            <p:cNvPr id="10" name="Picture 9">
+              <a:extLst>
+                <a:ext uri="{FF2B5EF4-FFF2-40B4-BE49-F238E27FC236}">
+                  <a16:creationId xmlns:a16="http://schemas.microsoft.com/office/drawing/2014/main" id="{A0CB6359-844C-4C18-9BBE-3B66DED31673}"/>
+                </a:ext>
+              </a:extLst>
+            </p:cNvPr>
+            <p:cNvPicPr>
+              <a:picLocks noChangeAspect="1"/>
+            </p:cNvPicPr>
+            <p:nvPr/>
+          </p:nvPicPr>
+          <p:blipFill>
+            <a:blip r:embed="rId2">
+              <a:extLst>
+                <a:ext uri="{28A0092B-C50C-407E-A947-70E740481C1C}">
+                  <a14:useLocalDpi xmlns:a14="http://schemas.microsoft.com/office/drawing/2010/main" val="0"/>
+                </a:ext>
+              </a:extLst>
+            </a:blip>
+            <a:srcRect/>
+            <a:stretch/>
+          </p:blipFill>
+          <p:spPr>
+            <a:xfrm>
+              <a:off x="5792540" y="1630766"/>
+              <a:ext cx="5953723" cy="3307623"/>
+            </a:xfrm>
+            <a:prstGeom prst="rect">
+              <a:avLst/>
+            </a:prstGeom>
+          </p:spPr>
+        </p:pic>
+        <p:pic>
+          <p:nvPicPr>
+            <p:cNvPr id="12" name="Picture 11">
+              <a:extLst>
+                <a:ext uri="{FF2B5EF4-FFF2-40B4-BE49-F238E27FC236}">
+                  <a16:creationId xmlns:a16="http://schemas.microsoft.com/office/drawing/2014/main" id="{FBDAECB3-3387-40DC-BDB8-52312C709A6B}"/>
+                </a:ext>
+              </a:extLst>
+            </p:cNvPr>
+            <p:cNvPicPr>
+              <a:picLocks noChangeAspect="1"/>
+            </p:cNvPicPr>
+            <p:nvPr/>
+          </p:nvPicPr>
+          <p:blipFill>
+            <a:blip r:embed="rId3">
+              <a:extLst>
+                <a:ext uri="{28A0092B-C50C-407E-A947-70E740481C1C}">
+                  <a14:useLocalDpi xmlns:a14="http://schemas.microsoft.com/office/drawing/2010/main" val="0"/>
+                </a:ext>
+              </a:extLst>
+            </a:blip>
+            <a:srcRect/>
+            <a:stretch/>
+          </p:blipFill>
+          <p:spPr>
+            <a:xfrm>
+              <a:off x="739584" y="1861167"/>
+              <a:ext cx="4634181" cy="3077221"/>
+            </a:xfrm>
+            <a:prstGeom prst="rect">
+              <a:avLst/>
+            </a:prstGeom>
+          </p:spPr>
+        </p:pic>
+      </p:grpSp>
+    </p:spTree>
+    <p:extLst>
+      <p:ext uri="{BB962C8B-B14F-4D97-AF65-F5344CB8AC3E}">
+        <p14:creationId xmlns:p14="http://schemas.microsoft.com/office/powerpoint/2010/main" val="2347237332"/>
+      </p:ext>
+    </p:extLst>
+  </p:cSld>
+  <p:clrMapOvr>
+    <a:masterClrMapping/>
+  </p:clrMapOvr>
+</p:sld>
+</file>
+
 <file path=ppt/theme/theme1.xml><?xml version="1.0" encoding="utf-8"?>
 <a:theme xmlns:a="http://schemas.openxmlformats.org/drawingml/2006/main" name="Office Theme">
   <a:themeElements>

</xml_diff>